<commit_message>
Edited Grammar and Wording
</commit_message>
<xml_diff>
--- a/SRS/SlideShow.pptx
+++ b/SRS/SlideShow.pptx
@@ -111,7 +111,7 @@
   </p:defaultTextStyle>
   <p:extLst>
     <p:ext uri="{EFAFB233-063F-42B5-8137-9DF3F51BA10A}">
-      <p15:sldGuideLst xmlns:p15="http://schemas.microsoft.com/office/powerpoint/2012/main" xmlns="">
+      <p15:sldGuideLst xmlns:p15="http://schemas.microsoft.com/office/powerpoint/2012/main">
         <p15:guide id="1" orient="horz" pos="2160">
           <p15:clr>
             <a:srgbClr val="A4A3A4"/>
@@ -7723,10 +7723,10 @@
           <p:cNvPr id="8" name="Rectangle 7">
             <a:extLst>
               <a:ext uri="{FF2B5EF4-FFF2-40B4-BE49-F238E27FC236}">
-                <a16:creationId xmlns:a16="http://schemas.microsoft.com/office/drawing/2014/main" xmlns="" id="{F81819F9-8CAC-4A6C-8F06-0482027F9736}"/>
+                <a16:creationId xmlns:a16="http://schemas.microsoft.com/office/drawing/2014/main" id="{F81819F9-8CAC-4A6C-8F06-0482027F9736}"/>
               </a:ext>
               <a:ext uri="{C183D7F6-B498-43B3-948B-1728B52AA6E4}">
-                <adec:decorative xmlns:adec="http://schemas.microsoft.com/office/drawing/2017/decorative" xmlns="" val="1"/>
+                <adec:decorative xmlns:adec="http://schemas.microsoft.com/office/drawing/2017/decorative" val="1"/>
               </a:ext>
             </a:extLst>
           </p:cNvPr>
@@ -7736,7 +7736,7 @@
           <p:nvPr>
             <p:extLst>
               <p:ext uri="{386F3935-93C4-4BCD-93E2-E3B085C9AB24}">
-                <p16:designElem xmlns:p16="http://schemas.microsoft.com/office/powerpoint/2015/main" xmlns="" val="1"/>
+                <p16:designElem xmlns:p16="http://schemas.microsoft.com/office/powerpoint/2015/main" val="1"/>
               </p:ext>
             </p:extLst>
           </p:nvPr>
@@ -7783,7 +7783,7 @@
           <p:cNvPr id="2" name="Title 1">
             <a:extLst>
               <a:ext uri="{FF2B5EF4-FFF2-40B4-BE49-F238E27FC236}">
-                <a16:creationId xmlns:a16="http://schemas.microsoft.com/office/drawing/2014/main" xmlns="" id="{ACCA312D-3828-4024-9CA0-545EE469B88F}"/>
+                <a16:creationId xmlns:a16="http://schemas.microsoft.com/office/drawing/2014/main" id="{ACCA312D-3828-4024-9CA0-545EE469B88F}"/>
               </a:ext>
             </a:extLst>
           </p:cNvPr>
@@ -7838,13 +7838,6 @@
               </a:rPr>
               <a:t>nites</a:t>
             </a:r>
-            <a:r>
-              <a:rPr lang="en-ZA" sz="5000" dirty="0">
-                <a:latin typeface="Times New Roman" panose="02020603050405020304" pitchFamily="18" charset="0"/>
-                <a:cs typeface="Times New Roman" panose="02020603050405020304" pitchFamily="18" charset="0"/>
-              </a:rPr>
-              <a:t/>
-            </a:r>
             <a:br>
               <a:rPr lang="en-ZA" sz="5000" dirty="0">
                 <a:latin typeface="Times New Roman" panose="02020603050405020304" pitchFamily="18" charset="0"/>
@@ -7870,7 +7863,7 @@
           <p:cNvPr id="3" name="Subtitle 2">
             <a:extLst>
               <a:ext uri="{FF2B5EF4-FFF2-40B4-BE49-F238E27FC236}">
-                <a16:creationId xmlns:a16="http://schemas.microsoft.com/office/drawing/2014/main" xmlns="" id="{C7503EA1-3526-455A-926A-3FC10C2110C2}"/>
+                <a16:creationId xmlns:a16="http://schemas.microsoft.com/office/drawing/2014/main" id="{C7503EA1-3526-455A-926A-3FC10C2110C2}"/>
               </a:ext>
             </a:extLst>
           </p:cNvPr>
@@ -7889,7 +7882,7 @@
         </p:spPr>
         <p:txBody>
           <a:bodyPr>
-            <a:normAutofit fontScale="92500"/>
+            <a:normAutofit/>
           </a:bodyPr>
           <a:lstStyle/>
           <a:p>
@@ -7898,33 +7891,8 @@
                 <a:latin typeface="Times New Roman" panose="02020603050405020304" pitchFamily="18" charset="0"/>
                 <a:cs typeface="Times New Roman" panose="02020603050405020304" pitchFamily="18" charset="0"/>
               </a:rPr>
-              <a:t>The </a:t>
-            </a:r>
-            <a:r>
-              <a:rPr lang="en-ZA" dirty="0" err="1">
-                <a:latin typeface="Times New Roman" panose="02020603050405020304" pitchFamily="18" charset="0"/>
-                <a:cs typeface="Times New Roman" panose="02020603050405020304" pitchFamily="18" charset="0"/>
-              </a:rPr>
-              <a:t>frist</a:t>
-            </a:r>
-            <a:r>
-              <a:rPr lang="en-ZA" dirty="0">
-                <a:latin typeface="Times New Roman" panose="02020603050405020304" pitchFamily="18" charset="0"/>
-                <a:cs typeface="Times New Roman" panose="02020603050405020304" pitchFamily="18" charset="0"/>
-              </a:rPr>
-              <a:t> </a:t>
-            </a:r>
-            <a:r>
-              <a:rPr lang="en-ZA" dirty="0" err="1">
-                <a:latin typeface="Times New Roman" panose="02020603050405020304" pitchFamily="18" charset="0"/>
-                <a:cs typeface="Times New Roman" panose="02020603050405020304" pitchFamily="18" charset="0"/>
-              </a:rPr>
-              <a:t>demmo</a:t>
-            </a:r>
-            <a:endParaRPr lang="en-ZA" dirty="0">
-              <a:latin typeface="Times New Roman" panose="02020603050405020304" pitchFamily="18" charset="0"/>
-              <a:cs typeface="Times New Roman" panose="02020603050405020304" pitchFamily="18" charset="0"/>
-            </a:endParaRPr>
+              <a:t>The First Demo</a:t>
+            </a:r>
           </a:p>
         </p:txBody>
       </p:sp>
@@ -7933,10 +7901,10 @@
           <p:cNvPr id="10" name="Rectangle 9">
             <a:extLst>
               <a:ext uri="{FF2B5EF4-FFF2-40B4-BE49-F238E27FC236}">
-                <a16:creationId xmlns:a16="http://schemas.microsoft.com/office/drawing/2014/main" xmlns="" id="{4A98CC08-AEC2-4E8F-8F52-0F5C6372DB4F}"/>
+                <a16:creationId xmlns:a16="http://schemas.microsoft.com/office/drawing/2014/main" id="{4A98CC08-AEC2-4E8F-8F52-0F5C6372DB4F}"/>
               </a:ext>
               <a:ext uri="{C183D7F6-B498-43B3-948B-1728B52AA6E4}">
-                <adec:decorative xmlns:adec="http://schemas.microsoft.com/office/drawing/2017/decorative" xmlns="" val="1"/>
+                <adec:decorative xmlns:adec="http://schemas.microsoft.com/office/drawing/2017/decorative" val="1"/>
               </a:ext>
             </a:extLst>
           </p:cNvPr>
@@ -7946,7 +7914,7 @@
           <p:nvPr>
             <p:extLst>
               <p:ext uri="{386F3935-93C4-4BCD-93E2-E3B085C9AB24}">
-                <p16:designElem xmlns:p16="http://schemas.microsoft.com/office/powerpoint/2015/main" xmlns="" val="1"/>
+                <p16:designElem xmlns:p16="http://schemas.microsoft.com/office/powerpoint/2015/main" val="1"/>
               </p:ext>
             </p:extLst>
           </p:nvPr>
@@ -7996,10 +7964,10 @@
           <p:cNvPr id="12" name="Group 11">
             <a:extLst>
               <a:ext uri="{FF2B5EF4-FFF2-40B4-BE49-F238E27FC236}">
-                <a16:creationId xmlns:a16="http://schemas.microsoft.com/office/drawing/2014/main" xmlns="" id="{5D1545E6-EB3C-4478-A661-A2CA963F129C}"/>
+                <a16:creationId xmlns:a16="http://schemas.microsoft.com/office/drawing/2014/main" id="{5D1545E6-EB3C-4478-A661-A2CA963F129C}"/>
               </a:ext>
               <a:ext uri="{C183D7F6-B498-43B3-948B-1728B52AA6E4}">
-                <adec:decorative xmlns:adec="http://schemas.microsoft.com/office/drawing/2017/decorative" xmlns="" val="1"/>
+                <adec:decorative xmlns:adec="http://schemas.microsoft.com/office/drawing/2017/decorative" val="1"/>
               </a:ext>
             </a:extLst>
           </p:cNvPr>
@@ -8009,7 +7977,7 @@
           <p:nvPr>
             <p:extLst>
               <p:ext uri="{386F3935-93C4-4BCD-93E2-E3B085C9AB24}">
-                <p16:designElem xmlns:p16="http://schemas.microsoft.com/office/powerpoint/2015/main" xmlns="" val="1"/>
+                <p16:designElem xmlns:p16="http://schemas.microsoft.com/office/powerpoint/2015/main" val="1"/>
               </p:ext>
             </p:extLst>
           </p:nvPr>
@@ -8034,10 +8002,10 @@
             <p:cNvPr id="13" name="Freeform 11">
               <a:extLst>
                 <a:ext uri="{FF2B5EF4-FFF2-40B4-BE49-F238E27FC236}">
-                  <a16:creationId xmlns:a16="http://schemas.microsoft.com/office/drawing/2014/main" xmlns="" id="{B2E5B960-0C5D-4F77-8E9F-9F3D883D83C5}"/>
+                  <a16:creationId xmlns:a16="http://schemas.microsoft.com/office/drawing/2014/main" id="{B2E5B960-0C5D-4F77-8E9F-9F3D883D83C5}"/>
                 </a:ext>
                 <a:ext uri="{C183D7F6-B498-43B3-948B-1728B52AA6E4}">
-                  <adec:decorative xmlns:adec="http://schemas.microsoft.com/office/drawing/2017/decorative" xmlns="" val="1"/>
+                  <adec:decorative xmlns:adec="http://schemas.microsoft.com/office/drawing/2017/decorative" val="1"/>
                 </a:ext>
               </a:extLst>
             </p:cNvPr>
@@ -8045,7 +8013,7 @@
             <p:nvPr>
               <p:extLst>
                 <p:ext uri="{386F3935-93C4-4BCD-93E2-E3B085C9AB24}">
-                  <p16:designElem xmlns:p16="http://schemas.microsoft.com/office/powerpoint/2015/main" xmlns="" val="1"/>
+                  <p16:designElem xmlns:p16="http://schemas.microsoft.com/office/powerpoint/2015/main" val="1"/>
                 </p:ext>
               </p:extLst>
             </p:nvPr>
@@ -8106,10 +8074,10 @@
             <p:cNvPr id="14" name="Freeform 12">
               <a:extLst>
                 <a:ext uri="{FF2B5EF4-FFF2-40B4-BE49-F238E27FC236}">
-                  <a16:creationId xmlns:a16="http://schemas.microsoft.com/office/drawing/2014/main" xmlns="" id="{258E44FC-92AD-43A0-BB05-DB268C82D8B2}"/>
+                  <a16:creationId xmlns:a16="http://schemas.microsoft.com/office/drawing/2014/main" id="{258E44FC-92AD-43A0-BB05-DB268C82D8B2}"/>
                 </a:ext>
                 <a:ext uri="{C183D7F6-B498-43B3-948B-1728B52AA6E4}">
-                  <adec:decorative xmlns:adec="http://schemas.microsoft.com/office/drawing/2017/decorative" xmlns="" val="1"/>
+                  <adec:decorative xmlns:adec="http://schemas.microsoft.com/office/drawing/2017/decorative" val="1"/>
                 </a:ext>
               </a:extLst>
             </p:cNvPr>
@@ -8117,7 +8085,7 @@
             <p:nvPr>
               <p:extLst>
                 <p:ext uri="{386F3935-93C4-4BCD-93E2-E3B085C9AB24}">
-                  <p16:designElem xmlns:p16="http://schemas.microsoft.com/office/powerpoint/2015/main" xmlns="" val="1"/>
+                  <p16:designElem xmlns:p16="http://schemas.microsoft.com/office/powerpoint/2015/main" val="1"/>
                 </p:ext>
               </p:extLst>
             </p:nvPr>
@@ -8183,10 +8151,10 @@
             <p:cNvPr id="15" name="Freeform 13">
               <a:extLst>
                 <a:ext uri="{FF2B5EF4-FFF2-40B4-BE49-F238E27FC236}">
-                  <a16:creationId xmlns:a16="http://schemas.microsoft.com/office/drawing/2014/main" xmlns="" id="{C63D3083-A56C-4199-8DE0-63C8BE9EDFE9}"/>
+                  <a16:creationId xmlns:a16="http://schemas.microsoft.com/office/drawing/2014/main" id="{C63D3083-A56C-4199-8DE0-63C8BE9EDFE9}"/>
                 </a:ext>
                 <a:ext uri="{C183D7F6-B498-43B3-948B-1728B52AA6E4}">
-                  <adec:decorative xmlns:adec="http://schemas.microsoft.com/office/drawing/2017/decorative" xmlns="" val="1"/>
+                  <adec:decorative xmlns:adec="http://schemas.microsoft.com/office/drawing/2017/decorative" val="1"/>
                 </a:ext>
               </a:extLst>
             </p:cNvPr>
@@ -8194,7 +8162,7 @@
             <p:nvPr>
               <p:extLst>
                 <p:ext uri="{386F3935-93C4-4BCD-93E2-E3B085C9AB24}">
-                  <p16:designElem xmlns:p16="http://schemas.microsoft.com/office/powerpoint/2015/main" xmlns="" val="1"/>
+                  <p16:designElem xmlns:p16="http://schemas.microsoft.com/office/powerpoint/2015/main" val="1"/>
                 </p:ext>
               </p:extLst>
             </p:nvPr>
@@ -8265,10 +8233,10 @@
             <p:cNvPr id="16" name="Freeform 14">
               <a:extLst>
                 <a:ext uri="{FF2B5EF4-FFF2-40B4-BE49-F238E27FC236}">
-                  <a16:creationId xmlns:a16="http://schemas.microsoft.com/office/drawing/2014/main" xmlns="" id="{C7CD3581-635D-438F-A64F-68404E7AE0B8}"/>
+                  <a16:creationId xmlns:a16="http://schemas.microsoft.com/office/drawing/2014/main" id="{C7CD3581-635D-438F-A64F-68404E7AE0B8}"/>
                 </a:ext>
                 <a:ext uri="{C183D7F6-B498-43B3-948B-1728B52AA6E4}">
-                  <adec:decorative xmlns:adec="http://schemas.microsoft.com/office/drawing/2017/decorative" xmlns="" val="1"/>
+                  <adec:decorative xmlns:adec="http://schemas.microsoft.com/office/drawing/2017/decorative" val="1"/>
                 </a:ext>
               </a:extLst>
             </p:cNvPr>
@@ -8276,7 +8244,7 @@
             <p:nvPr>
               <p:extLst>
                 <p:ext uri="{386F3935-93C4-4BCD-93E2-E3B085C9AB24}">
-                  <p16:designElem xmlns:p16="http://schemas.microsoft.com/office/powerpoint/2015/main" xmlns="" val="1"/>
+                  <p16:designElem xmlns:p16="http://schemas.microsoft.com/office/powerpoint/2015/main" val="1"/>
                 </p:ext>
               </p:extLst>
             </p:nvPr>
@@ -8327,10 +8295,10 @@
             <p:cNvPr id="17" name="Freeform 15">
               <a:extLst>
                 <a:ext uri="{FF2B5EF4-FFF2-40B4-BE49-F238E27FC236}">
-                  <a16:creationId xmlns:a16="http://schemas.microsoft.com/office/drawing/2014/main" xmlns="" id="{AD6904C0-211C-41A2-BDB8-3B07C90BBB4C}"/>
+                  <a16:creationId xmlns:a16="http://schemas.microsoft.com/office/drawing/2014/main" id="{AD6904C0-211C-41A2-BDB8-3B07C90BBB4C}"/>
                 </a:ext>
                 <a:ext uri="{C183D7F6-B498-43B3-948B-1728B52AA6E4}">
-                  <adec:decorative xmlns:adec="http://schemas.microsoft.com/office/drawing/2017/decorative" xmlns="" val="1"/>
+                  <adec:decorative xmlns:adec="http://schemas.microsoft.com/office/drawing/2017/decorative" val="1"/>
                 </a:ext>
               </a:extLst>
             </p:cNvPr>
@@ -8338,7 +8306,7 @@
             <p:nvPr>
               <p:extLst>
                 <p:ext uri="{386F3935-93C4-4BCD-93E2-E3B085C9AB24}">
-                  <p16:designElem xmlns:p16="http://schemas.microsoft.com/office/powerpoint/2015/main" xmlns="" val="1"/>
+                  <p16:designElem xmlns:p16="http://schemas.microsoft.com/office/powerpoint/2015/main" val="1"/>
                 </p:ext>
               </p:extLst>
             </p:nvPr>
@@ -8424,10 +8392,10 @@
             <p:cNvPr id="18" name="Freeform 16">
               <a:extLst>
                 <a:ext uri="{FF2B5EF4-FFF2-40B4-BE49-F238E27FC236}">
-                  <a16:creationId xmlns:a16="http://schemas.microsoft.com/office/drawing/2014/main" xmlns="" id="{B0837DA6-CAF9-4E78-A39E-6358EDE2B108}"/>
+                  <a16:creationId xmlns:a16="http://schemas.microsoft.com/office/drawing/2014/main" id="{B0837DA6-CAF9-4E78-A39E-6358EDE2B108}"/>
                 </a:ext>
                 <a:ext uri="{C183D7F6-B498-43B3-948B-1728B52AA6E4}">
-                  <adec:decorative xmlns:adec="http://schemas.microsoft.com/office/drawing/2017/decorative" xmlns="" val="1"/>
+                  <adec:decorative xmlns:adec="http://schemas.microsoft.com/office/drawing/2017/decorative" val="1"/>
                 </a:ext>
               </a:extLst>
             </p:cNvPr>
@@ -8435,7 +8403,7 @@
             <p:nvPr>
               <p:extLst>
                 <p:ext uri="{386F3935-93C4-4BCD-93E2-E3B085C9AB24}">
-                  <p16:designElem xmlns:p16="http://schemas.microsoft.com/office/powerpoint/2015/main" xmlns="" val="1"/>
+                  <p16:designElem xmlns:p16="http://schemas.microsoft.com/office/powerpoint/2015/main" val="1"/>
                 </p:ext>
               </p:extLst>
             </p:nvPr>
@@ -8516,10 +8484,10 @@
             <p:cNvPr id="19" name="Freeform 17">
               <a:extLst>
                 <a:ext uri="{FF2B5EF4-FFF2-40B4-BE49-F238E27FC236}">
-                  <a16:creationId xmlns:a16="http://schemas.microsoft.com/office/drawing/2014/main" xmlns="" id="{0A99DD7D-3AB3-471E-842F-8AFEA09D07E4}"/>
+                  <a16:creationId xmlns:a16="http://schemas.microsoft.com/office/drawing/2014/main" id="{0A99DD7D-3AB3-471E-842F-8AFEA09D07E4}"/>
                 </a:ext>
                 <a:ext uri="{C183D7F6-B498-43B3-948B-1728B52AA6E4}">
-                  <adec:decorative xmlns:adec="http://schemas.microsoft.com/office/drawing/2017/decorative" xmlns="" val="1"/>
+                  <adec:decorative xmlns:adec="http://schemas.microsoft.com/office/drawing/2017/decorative" val="1"/>
                 </a:ext>
               </a:extLst>
             </p:cNvPr>
@@ -8527,7 +8495,7 @@
             <p:nvPr>
               <p:extLst>
                 <p:ext uri="{386F3935-93C4-4BCD-93E2-E3B085C9AB24}">
-                  <p16:designElem xmlns:p16="http://schemas.microsoft.com/office/powerpoint/2015/main" xmlns="" val="1"/>
+                  <p16:designElem xmlns:p16="http://schemas.microsoft.com/office/powerpoint/2015/main" val="1"/>
                 </p:ext>
               </p:extLst>
             </p:nvPr>
@@ -8588,10 +8556,10 @@
             <p:cNvPr id="20" name="Freeform 18">
               <a:extLst>
                 <a:ext uri="{FF2B5EF4-FFF2-40B4-BE49-F238E27FC236}">
-                  <a16:creationId xmlns:a16="http://schemas.microsoft.com/office/drawing/2014/main" xmlns="" id="{9C70B0D4-92FE-478F-86BD-93BA2C4DFCDC}"/>
+                  <a16:creationId xmlns:a16="http://schemas.microsoft.com/office/drawing/2014/main" id="{9C70B0D4-92FE-478F-86BD-93BA2C4DFCDC}"/>
                 </a:ext>
                 <a:ext uri="{C183D7F6-B498-43B3-948B-1728B52AA6E4}">
-                  <adec:decorative xmlns:adec="http://schemas.microsoft.com/office/drawing/2017/decorative" xmlns="" val="1"/>
+                  <adec:decorative xmlns:adec="http://schemas.microsoft.com/office/drawing/2017/decorative" val="1"/>
                 </a:ext>
               </a:extLst>
             </p:cNvPr>
@@ -8599,7 +8567,7 @@
             <p:nvPr>
               <p:extLst>
                 <p:ext uri="{386F3935-93C4-4BCD-93E2-E3B085C9AB24}">
-                  <p16:designElem xmlns:p16="http://schemas.microsoft.com/office/powerpoint/2015/main" xmlns="" val="1"/>
+                  <p16:designElem xmlns:p16="http://schemas.microsoft.com/office/powerpoint/2015/main" val="1"/>
                 </p:ext>
               </p:extLst>
             </p:nvPr>
@@ -8680,10 +8648,10 @@
             <p:cNvPr id="21" name="Freeform 19">
               <a:extLst>
                 <a:ext uri="{FF2B5EF4-FFF2-40B4-BE49-F238E27FC236}">
-                  <a16:creationId xmlns:a16="http://schemas.microsoft.com/office/drawing/2014/main" xmlns="" id="{C9156BE6-11D4-4696-9E3F-C325BFAC8196}"/>
+                  <a16:creationId xmlns:a16="http://schemas.microsoft.com/office/drawing/2014/main" id="{C9156BE6-11D4-4696-9E3F-C325BFAC8196}"/>
                 </a:ext>
                 <a:ext uri="{C183D7F6-B498-43B3-948B-1728B52AA6E4}">
-                  <adec:decorative xmlns:adec="http://schemas.microsoft.com/office/drawing/2017/decorative" xmlns="" val="1"/>
+                  <adec:decorative xmlns:adec="http://schemas.microsoft.com/office/drawing/2017/decorative" val="1"/>
                 </a:ext>
               </a:extLst>
             </p:cNvPr>
@@ -8691,7 +8659,7 @@
             <p:nvPr>
               <p:extLst>
                 <p:ext uri="{386F3935-93C4-4BCD-93E2-E3B085C9AB24}">
-                  <p16:designElem xmlns:p16="http://schemas.microsoft.com/office/powerpoint/2015/main" xmlns="" val="1"/>
+                  <p16:designElem xmlns:p16="http://schemas.microsoft.com/office/powerpoint/2015/main" val="1"/>
                 </p:ext>
               </p:extLst>
             </p:nvPr>
@@ -8807,10 +8775,10 @@
             <p:cNvPr id="22" name="Freeform 20">
               <a:extLst>
                 <a:ext uri="{FF2B5EF4-FFF2-40B4-BE49-F238E27FC236}">
-                  <a16:creationId xmlns:a16="http://schemas.microsoft.com/office/drawing/2014/main" xmlns="" id="{4E667226-1D20-4A9D-BBE3-AC17EA436F05}"/>
+                  <a16:creationId xmlns:a16="http://schemas.microsoft.com/office/drawing/2014/main" id="{4E667226-1D20-4A9D-BBE3-AC17EA436F05}"/>
                 </a:ext>
                 <a:ext uri="{C183D7F6-B498-43B3-948B-1728B52AA6E4}">
-                  <adec:decorative xmlns:adec="http://schemas.microsoft.com/office/drawing/2017/decorative" xmlns="" val="1"/>
+                  <adec:decorative xmlns:adec="http://schemas.microsoft.com/office/drawing/2017/decorative" val="1"/>
                 </a:ext>
               </a:extLst>
             </p:cNvPr>
@@ -8818,7 +8786,7 @@
             <p:nvPr>
               <p:extLst>
                 <p:ext uri="{386F3935-93C4-4BCD-93E2-E3B085C9AB24}">
-                  <p16:designElem xmlns:p16="http://schemas.microsoft.com/office/powerpoint/2015/main" xmlns="" val="1"/>
+                  <p16:designElem xmlns:p16="http://schemas.microsoft.com/office/powerpoint/2015/main" val="1"/>
                 </p:ext>
               </p:extLst>
             </p:nvPr>
@@ -8869,10 +8837,10 @@
             <p:cNvPr id="23" name="Freeform 21">
               <a:extLst>
                 <a:ext uri="{FF2B5EF4-FFF2-40B4-BE49-F238E27FC236}">
-                  <a16:creationId xmlns:a16="http://schemas.microsoft.com/office/drawing/2014/main" xmlns="" id="{2F87E3B6-5202-4434-9B26-42B46774F327}"/>
+                  <a16:creationId xmlns:a16="http://schemas.microsoft.com/office/drawing/2014/main" id="{2F87E3B6-5202-4434-9B26-42B46774F327}"/>
                 </a:ext>
                 <a:ext uri="{C183D7F6-B498-43B3-948B-1728B52AA6E4}">
-                  <adec:decorative xmlns:adec="http://schemas.microsoft.com/office/drawing/2017/decorative" xmlns="" val="1"/>
+                  <adec:decorative xmlns:adec="http://schemas.microsoft.com/office/drawing/2017/decorative" val="1"/>
                 </a:ext>
               </a:extLst>
             </p:cNvPr>
@@ -8880,7 +8848,7 @@
             <p:nvPr>
               <p:extLst>
                 <p:ext uri="{386F3935-93C4-4BCD-93E2-E3B085C9AB24}">
-                  <p16:designElem xmlns:p16="http://schemas.microsoft.com/office/powerpoint/2015/main" xmlns="" val="1"/>
+                  <p16:designElem xmlns:p16="http://schemas.microsoft.com/office/powerpoint/2015/main" val="1"/>
                 </p:ext>
               </p:extLst>
             </p:nvPr>
@@ -8941,10 +8909,10 @@
             <p:cNvPr id="24" name="Freeform 22">
               <a:extLst>
                 <a:ext uri="{FF2B5EF4-FFF2-40B4-BE49-F238E27FC236}">
-                  <a16:creationId xmlns:a16="http://schemas.microsoft.com/office/drawing/2014/main" xmlns="" id="{AEA5E85F-F1F4-40E4-A62C-95324F674929}"/>
+                  <a16:creationId xmlns:a16="http://schemas.microsoft.com/office/drawing/2014/main" id="{AEA5E85F-F1F4-40E4-A62C-95324F674929}"/>
                 </a:ext>
                 <a:ext uri="{C183D7F6-B498-43B3-948B-1728B52AA6E4}">
-                  <adec:decorative xmlns:adec="http://schemas.microsoft.com/office/drawing/2017/decorative" xmlns="" val="1"/>
+                  <adec:decorative xmlns:adec="http://schemas.microsoft.com/office/drawing/2017/decorative" val="1"/>
                 </a:ext>
               </a:extLst>
             </p:cNvPr>
@@ -8952,7 +8920,7 @@
             <p:nvPr>
               <p:extLst>
                 <p:ext uri="{386F3935-93C4-4BCD-93E2-E3B085C9AB24}">
-                  <p16:designElem xmlns:p16="http://schemas.microsoft.com/office/powerpoint/2015/main" xmlns="" val="1"/>
+                  <p16:designElem xmlns:p16="http://schemas.microsoft.com/office/powerpoint/2015/main" val="1"/>
                 </p:ext>
               </p:extLst>
             </p:nvPr>
@@ -9024,10 +8992,10 @@
           <p:cNvPr id="26" name="Group 25">
             <a:extLst>
               <a:ext uri="{FF2B5EF4-FFF2-40B4-BE49-F238E27FC236}">
-                <a16:creationId xmlns:a16="http://schemas.microsoft.com/office/drawing/2014/main" xmlns="" id="{40A75861-F6C5-44A9-B161-B03701CBDE0C}"/>
+                <a16:creationId xmlns:a16="http://schemas.microsoft.com/office/drawing/2014/main" id="{40A75861-F6C5-44A9-B161-B03701CBDE0C}"/>
               </a:ext>
               <a:ext uri="{C183D7F6-B498-43B3-948B-1728B52AA6E4}">
-                <adec:decorative xmlns:adec="http://schemas.microsoft.com/office/drawing/2017/decorative" xmlns="" val="1"/>
+                <adec:decorative xmlns:adec="http://schemas.microsoft.com/office/drawing/2017/decorative" val="1"/>
               </a:ext>
             </a:extLst>
           </p:cNvPr>
@@ -9037,7 +9005,7 @@
           <p:nvPr>
             <p:extLst>
               <p:ext uri="{386F3935-93C4-4BCD-93E2-E3B085C9AB24}">
-                <p16:designElem xmlns:p16="http://schemas.microsoft.com/office/powerpoint/2015/main" xmlns="" val="1"/>
+                <p16:designElem xmlns:p16="http://schemas.microsoft.com/office/powerpoint/2015/main" val="1"/>
               </p:ext>
             </p:extLst>
           </p:nvPr>
@@ -9061,10 +9029,10 @@
             <p:cNvPr id="27" name="Freeform 27">
               <a:extLst>
                 <a:ext uri="{FF2B5EF4-FFF2-40B4-BE49-F238E27FC236}">
-                  <a16:creationId xmlns:a16="http://schemas.microsoft.com/office/drawing/2014/main" xmlns="" id="{72EE642D-4F69-47C0-99BA-CE435035735F}"/>
+                  <a16:creationId xmlns:a16="http://schemas.microsoft.com/office/drawing/2014/main" id="{72EE642D-4F69-47C0-99BA-CE435035735F}"/>
                 </a:ext>
                 <a:ext uri="{C183D7F6-B498-43B3-948B-1728B52AA6E4}">
-                  <adec:decorative xmlns:adec="http://schemas.microsoft.com/office/drawing/2017/decorative" xmlns="" val="1"/>
+                  <adec:decorative xmlns:adec="http://schemas.microsoft.com/office/drawing/2017/decorative" val="1"/>
                 </a:ext>
               </a:extLst>
             </p:cNvPr>
@@ -9072,7 +9040,7 @@
             <p:nvPr>
               <p:extLst>
                 <p:ext uri="{386F3935-93C4-4BCD-93E2-E3B085C9AB24}">
-                  <p16:designElem xmlns:p16="http://schemas.microsoft.com/office/powerpoint/2015/main" xmlns="" val="1"/>
+                  <p16:designElem xmlns:p16="http://schemas.microsoft.com/office/powerpoint/2015/main" val="1"/>
                 </p:ext>
               </p:extLst>
             </p:nvPr>
@@ -9178,10 +9146,10 @@
             <p:cNvPr id="28" name="Freeform 28">
               <a:extLst>
                 <a:ext uri="{FF2B5EF4-FFF2-40B4-BE49-F238E27FC236}">
-                  <a16:creationId xmlns:a16="http://schemas.microsoft.com/office/drawing/2014/main" xmlns="" id="{26178CE4-DA2D-46EA-AB8D-341C5AC563D6}"/>
+                  <a16:creationId xmlns:a16="http://schemas.microsoft.com/office/drawing/2014/main" id="{26178CE4-DA2D-46EA-AB8D-341C5AC563D6}"/>
                 </a:ext>
                 <a:ext uri="{C183D7F6-B498-43B3-948B-1728B52AA6E4}">
-                  <adec:decorative xmlns:adec="http://schemas.microsoft.com/office/drawing/2017/decorative" xmlns="" val="1"/>
+                  <adec:decorative xmlns:adec="http://schemas.microsoft.com/office/drawing/2017/decorative" val="1"/>
                 </a:ext>
               </a:extLst>
             </p:cNvPr>
@@ -9189,7 +9157,7 @@
             <p:nvPr>
               <p:extLst>
                 <p:ext uri="{386F3935-93C4-4BCD-93E2-E3B085C9AB24}">
-                  <p16:designElem xmlns:p16="http://schemas.microsoft.com/office/powerpoint/2015/main" xmlns="" val="1"/>
+                  <p16:designElem xmlns:p16="http://schemas.microsoft.com/office/powerpoint/2015/main" val="1"/>
                 </p:ext>
               </p:extLst>
             </p:nvPr>
@@ -9260,10 +9228,10 @@
             <p:cNvPr id="29" name="Freeform 29">
               <a:extLst>
                 <a:ext uri="{FF2B5EF4-FFF2-40B4-BE49-F238E27FC236}">
-                  <a16:creationId xmlns:a16="http://schemas.microsoft.com/office/drawing/2014/main" xmlns="" id="{698E9F53-8381-4FA5-A510-846925D242CF}"/>
+                  <a16:creationId xmlns:a16="http://schemas.microsoft.com/office/drawing/2014/main" id="{698E9F53-8381-4FA5-A510-846925D242CF}"/>
                 </a:ext>
                 <a:ext uri="{C183D7F6-B498-43B3-948B-1728B52AA6E4}">
-                  <adec:decorative xmlns:adec="http://schemas.microsoft.com/office/drawing/2017/decorative" xmlns="" val="1"/>
+                  <adec:decorative xmlns:adec="http://schemas.microsoft.com/office/drawing/2017/decorative" val="1"/>
                 </a:ext>
               </a:extLst>
             </p:cNvPr>
@@ -9271,7 +9239,7 @@
             <p:nvPr>
               <p:extLst>
                 <p:ext uri="{386F3935-93C4-4BCD-93E2-E3B085C9AB24}">
-                  <p16:designElem xmlns:p16="http://schemas.microsoft.com/office/powerpoint/2015/main" xmlns="" val="1"/>
+                  <p16:designElem xmlns:p16="http://schemas.microsoft.com/office/powerpoint/2015/main" val="1"/>
                 </p:ext>
               </p:extLst>
             </p:nvPr>
@@ -9342,10 +9310,10 @@
             <p:cNvPr id="30" name="Freeform 30">
               <a:extLst>
                 <a:ext uri="{FF2B5EF4-FFF2-40B4-BE49-F238E27FC236}">
-                  <a16:creationId xmlns:a16="http://schemas.microsoft.com/office/drawing/2014/main" xmlns="" id="{B13CE284-F21E-411B-BB8E-9C03B853CE44}"/>
+                  <a16:creationId xmlns:a16="http://schemas.microsoft.com/office/drawing/2014/main" id="{B13CE284-F21E-411B-BB8E-9C03B853CE44}"/>
                 </a:ext>
                 <a:ext uri="{C183D7F6-B498-43B3-948B-1728B52AA6E4}">
-                  <adec:decorative xmlns:adec="http://schemas.microsoft.com/office/drawing/2017/decorative" xmlns="" val="1"/>
+                  <adec:decorative xmlns:adec="http://schemas.microsoft.com/office/drawing/2017/decorative" val="1"/>
                 </a:ext>
               </a:extLst>
             </p:cNvPr>
@@ -9353,7 +9321,7 @@
             <p:nvPr>
               <p:extLst>
                 <p:ext uri="{386F3935-93C4-4BCD-93E2-E3B085C9AB24}">
-                  <p16:designElem xmlns:p16="http://schemas.microsoft.com/office/powerpoint/2015/main" xmlns="" val="1"/>
+                  <p16:designElem xmlns:p16="http://schemas.microsoft.com/office/powerpoint/2015/main" val="1"/>
                 </p:ext>
               </p:extLst>
             </p:nvPr>
@@ -9439,10 +9407,10 @@
             <p:cNvPr id="31" name="Freeform 31">
               <a:extLst>
                 <a:ext uri="{FF2B5EF4-FFF2-40B4-BE49-F238E27FC236}">
-                  <a16:creationId xmlns:a16="http://schemas.microsoft.com/office/drawing/2014/main" xmlns="" id="{23DF4578-4703-437C-A797-2A2D0CEE5F45}"/>
+                  <a16:creationId xmlns:a16="http://schemas.microsoft.com/office/drawing/2014/main" id="{23DF4578-4703-437C-A797-2A2D0CEE5F45}"/>
                 </a:ext>
                 <a:ext uri="{C183D7F6-B498-43B3-948B-1728B52AA6E4}">
-                  <adec:decorative xmlns:adec="http://schemas.microsoft.com/office/drawing/2017/decorative" xmlns="" val="1"/>
+                  <adec:decorative xmlns:adec="http://schemas.microsoft.com/office/drawing/2017/decorative" val="1"/>
                 </a:ext>
               </a:extLst>
             </p:cNvPr>
@@ -9450,7 +9418,7 @@
             <p:nvPr>
               <p:extLst>
                 <p:ext uri="{386F3935-93C4-4BCD-93E2-E3B085C9AB24}">
-                  <p16:designElem xmlns:p16="http://schemas.microsoft.com/office/powerpoint/2015/main" xmlns="" val="1"/>
+                  <p16:designElem xmlns:p16="http://schemas.microsoft.com/office/powerpoint/2015/main" val="1"/>
                 </p:ext>
               </p:extLst>
             </p:nvPr>
@@ -9546,10 +9514,10 @@
             <p:cNvPr id="32" name="Freeform 32">
               <a:extLst>
                 <a:ext uri="{FF2B5EF4-FFF2-40B4-BE49-F238E27FC236}">
-                  <a16:creationId xmlns:a16="http://schemas.microsoft.com/office/drawing/2014/main" xmlns="" id="{F878F330-AF64-4F8F-88FD-A4A408D6D368}"/>
+                  <a16:creationId xmlns:a16="http://schemas.microsoft.com/office/drawing/2014/main" id="{F878F330-AF64-4F8F-88FD-A4A408D6D368}"/>
                 </a:ext>
                 <a:ext uri="{C183D7F6-B498-43B3-948B-1728B52AA6E4}">
-                  <adec:decorative xmlns:adec="http://schemas.microsoft.com/office/drawing/2017/decorative" xmlns="" val="1"/>
+                  <adec:decorative xmlns:adec="http://schemas.microsoft.com/office/drawing/2017/decorative" val="1"/>
                 </a:ext>
               </a:extLst>
             </p:cNvPr>
@@ -9557,7 +9525,7 @@
             <p:nvPr>
               <p:extLst>
                 <p:ext uri="{386F3935-93C4-4BCD-93E2-E3B085C9AB24}">
-                  <p16:designElem xmlns:p16="http://schemas.microsoft.com/office/powerpoint/2015/main" xmlns="" val="1"/>
+                  <p16:designElem xmlns:p16="http://schemas.microsoft.com/office/powerpoint/2015/main" val="1"/>
                 </p:ext>
               </p:extLst>
             </p:nvPr>
@@ -9608,10 +9576,10 @@
             <p:cNvPr id="33" name="Freeform 33">
               <a:extLst>
                 <a:ext uri="{FF2B5EF4-FFF2-40B4-BE49-F238E27FC236}">
-                  <a16:creationId xmlns:a16="http://schemas.microsoft.com/office/drawing/2014/main" xmlns="" id="{AC9B00BF-4FB7-42FA-BBBD-7DB54ED3F061}"/>
+                  <a16:creationId xmlns:a16="http://schemas.microsoft.com/office/drawing/2014/main" id="{AC9B00BF-4FB7-42FA-BBBD-7DB54ED3F061}"/>
                 </a:ext>
                 <a:ext uri="{C183D7F6-B498-43B3-948B-1728B52AA6E4}">
-                  <adec:decorative xmlns:adec="http://schemas.microsoft.com/office/drawing/2017/decorative" xmlns="" val="1"/>
+                  <adec:decorative xmlns:adec="http://schemas.microsoft.com/office/drawing/2017/decorative" val="1"/>
                 </a:ext>
               </a:extLst>
             </p:cNvPr>
@@ -9619,7 +9587,7 @@
             <p:nvPr>
               <p:extLst>
                 <p:ext uri="{386F3935-93C4-4BCD-93E2-E3B085C9AB24}">
-                  <p16:designElem xmlns:p16="http://schemas.microsoft.com/office/powerpoint/2015/main" xmlns="" val="1"/>
+                  <p16:designElem xmlns:p16="http://schemas.microsoft.com/office/powerpoint/2015/main" val="1"/>
                 </p:ext>
               </p:extLst>
             </p:nvPr>
@@ -9685,10 +9653,10 @@
             <p:cNvPr id="34" name="Freeform 34">
               <a:extLst>
                 <a:ext uri="{FF2B5EF4-FFF2-40B4-BE49-F238E27FC236}">
-                  <a16:creationId xmlns:a16="http://schemas.microsoft.com/office/drawing/2014/main" xmlns="" id="{BD3D64CA-2AAD-4609-8DAA-3EAD4609A6B1}"/>
+                  <a16:creationId xmlns:a16="http://schemas.microsoft.com/office/drawing/2014/main" id="{BD3D64CA-2AAD-4609-8DAA-3EAD4609A6B1}"/>
                 </a:ext>
                 <a:ext uri="{C183D7F6-B498-43B3-948B-1728B52AA6E4}">
-                  <adec:decorative xmlns:adec="http://schemas.microsoft.com/office/drawing/2017/decorative" xmlns="" val="1"/>
+                  <adec:decorative xmlns:adec="http://schemas.microsoft.com/office/drawing/2017/decorative" val="1"/>
                 </a:ext>
               </a:extLst>
             </p:cNvPr>
@@ -9696,7 +9664,7 @@
             <p:nvPr>
               <p:extLst>
                 <p:ext uri="{386F3935-93C4-4BCD-93E2-E3B085C9AB24}">
-                  <p16:designElem xmlns:p16="http://schemas.microsoft.com/office/powerpoint/2015/main" xmlns="" val="1"/>
+                  <p16:designElem xmlns:p16="http://schemas.microsoft.com/office/powerpoint/2015/main" val="1"/>
                 </p:ext>
               </p:extLst>
             </p:nvPr>
@@ -9807,10 +9775,10 @@
             <p:cNvPr id="35" name="Freeform 35">
               <a:extLst>
                 <a:ext uri="{FF2B5EF4-FFF2-40B4-BE49-F238E27FC236}">
-                  <a16:creationId xmlns:a16="http://schemas.microsoft.com/office/drawing/2014/main" xmlns="" id="{C669E05A-8550-4E91-B29E-E1912228EC93}"/>
+                  <a16:creationId xmlns:a16="http://schemas.microsoft.com/office/drawing/2014/main" id="{C669E05A-8550-4E91-B29E-E1912228EC93}"/>
                 </a:ext>
                 <a:ext uri="{C183D7F6-B498-43B3-948B-1728B52AA6E4}">
-                  <adec:decorative xmlns:adec="http://schemas.microsoft.com/office/drawing/2017/decorative" xmlns="" val="1"/>
+                  <adec:decorative xmlns:adec="http://schemas.microsoft.com/office/drawing/2017/decorative" val="1"/>
                 </a:ext>
               </a:extLst>
             </p:cNvPr>
@@ -9818,7 +9786,7 @@
             <p:nvPr>
               <p:extLst>
                 <p:ext uri="{386F3935-93C4-4BCD-93E2-E3B085C9AB24}">
-                  <p16:designElem xmlns:p16="http://schemas.microsoft.com/office/powerpoint/2015/main" xmlns="" val="1"/>
+                  <p16:designElem xmlns:p16="http://schemas.microsoft.com/office/powerpoint/2015/main" val="1"/>
                 </p:ext>
               </p:extLst>
             </p:nvPr>
@@ -9869,10 +9837,10 @@
             <p:cNvPr id="36" name="Freeform 36">
               <a:extLst>
                 <a:ext uri="{FF2B5EF4-FFF2-40B4-BE49-F238E27FC236}">
-                  <a16:creationId xmlns:a16="http://schemas.microsoft.com/office/drawing/2014/main" xmlns="" id="{F8C1FD53-1E8F-46CA-BC2D-FCEC4DAE07F6}"/>
+                  <a16:creationId xmlns:a16="http://schemas.microsoft.com/office/drawing/2014/main" id="{F8C1FD53-1E8F-46CA-BC2D-FCEC4DAE07F6}"/>
                 </a:ext>
                 <a:ext uri="{C183D7F6-B498-43B3-948B-1728B52AA6E4}">
-                  <adec:decorative xmlns:adec="http://schemas.microsoft.com/office/drawing/2017/decorative" xmlns="" val="1"/>
+                  <adec:decorative xmlns:adec="http://schemas.microsoft.com/office/drawing/2017/decorative" val="1"/>
                 </a:ext>
               </a:extLst>
             </p:cNvPr>
@@ -9880,7 +9848,7 @@
             <p:nvPr>
               <p:extLst>
                 <p:ext uri="{386F3935-93C4-4BCD-93E2-E3B085C9AB24}">
-                  <p16:designElem xmlns:p16="http://schemas.microsoft.com/office/powerpoint/2015/main" xmlns="" val="1"/>
+                  <p16:designElem xmlns:p16="http://schemas.microsoft.com/office/powerpoint/2015/main" val="1"/>
                 </p:ext>
               </p:extLst>
             </p:nvPr>
@@ -9951,10 +9919,10 @@
             <p:cNvPr id="37" name="Freeform 37">
               <a:extLst>
                 <a:ext uri="{FF2B5EF4-FFF2-40B4-BE49-F238E27FC236}">
-                  <a16:creationId xmlns:a16="http://schemas.microsoft.com/office/drawing/2014/main" xmlns="" id="{CC97A31F-CFDE-4EA3-98F1-13FDD16702E1}"/>
+                  <a16:creationId xmlns:a16="http://schemas.microsoft.com/office/drawing/2014/main" id="{CC97A31F-CFDE-4EA3-98F1-13FDD16702E1}"/>
                 </a:ext>
                 <a:ext uri="{C183D7F6-B498-43B3-948B-1728B52AA6E4}">
-                  <adec:decorative xmlns:adec="http://schemas.microsoft.com/office/drawing/2017/decorative" xmlns="" val="1"/>
+                  <adec:decorative xmlns:adec="http://schemas.microsoft.com/office/drawing/2017/decorative" val="1"/>
                 </a:ext>
               </a:extLst>
             </p:cNvPr>
@@ -9962,7 +9930,7 @@
             <p:nvPr>
               <p:extLst>
                 <p:ext uri="{386F3935-93C4-4BCD-93E2-E3B085C9AB24}">
-                  <p16:designElem xmlns:p16="http://schemas.microsoft.com/office/powerpoint/2015/main" xmlns="" val="1"/>
+                  <p16:designElem xmlns:p16="http://schemas.microsoft.com/office/powerpoint/2015/main" val="1"/>
                 </p:ext>
               </p:extLst>
             </p:nvPr>
@@ -10028,10 +9996,10 @@
             <p:cNvPr id="38" name="Freeform 38">
               <a:extLst>
                 <a:ext uri="{FF2B5EF4-FFF2-40B4-BE49-F238E27FC236}">
-                  <a16:creationId xmlns:a16="http://schemas.microsoft.com/office/drawing/2014/main" xmlns="" id="{9E1540E7-E6C3-4907-B70A-B17568365597}"/>
+                  <a16:creationId xmlns:a16="http://schemas.microsoft.com/office/drawing/2014/main" id="{9E1540E7-E6C3-4907-B70A-B17568365597}"/>
                 </a:ext>
                 <a:ext uri="{C183D7F6-B498-43B3-948B-1728B52AA6E4}">
-                  <adec:decorative xmlns:adec="http://schemas.microsoft.com/office/drawing/2017/decorative" xmlns="" val="1"/>
+                  <adec:decorative xmlns:adec="http://schemas.microsoft.com/office/drawing/2017/decorative" val="1"/>
                 </a:ext>
               </a:extLst>
             </p:cNvPr>
@@ -10039,7 +10007,7 @@
             <p:nvPr>
               <p:extLst>
                 <p:ext uri="{386F3935-93C4-4BCD-93E2-E3B085C9AB24}">
-                  <p16:designElem xmlns:p16="http://schemas.microsoft.com/office/powerpoint/2015/main" xmlns="" val="1"/>
+                  <p16:designElem xmlns:p16="http://schemas.microsoft.com/office/powerpoint/2015/main" val="1"/>
                 </p:ext>
               </p:extLst>
             </p:nvPr>
@@ -10111,10 +10079,10 @@
           <p:cNvPr id="40" name="Freeform 11">
             <a:extLst>
               <a:ext uri="{FF2B5EF4-FFF2-40B4-BE49-F238E27FC236}">
-                <a16:creationId xmlns:a16="http://schemas.microsoft.com/office/drawing/2014/main" xmlns="" id="{1310EFE2-B91D-47E7-B117-C2A802800A7C}"/>
+                <a16:creationId xmlns:a16="http://schemas.microsoft.com/office/drawing/2014/main" id="{1310EFE2-B91D-47E7-B117-C2A802800A7C}"/>
               </a:ext>
               <a:ext uri="{C183D7F6-B498-43B3-948B-1728B52AA6E4}">
-                <adec:decorative xmlns:adec="http://schemas.microsoft.com/office/drawing/2017/decorative" xmlns="" val="1"/>
+                <adec:decorative xmlns:adec="http://schemas.microsoft.com/office/drawing/2017/decorative" val="1"/>
               </a:ext>
             </a:extLst>
           </p:cNvPr>
@@ -10124,7 +10092,7 @@
           <p:nvPr>
             <p:extLst>
               <p:ext uri="{386F3935-93C4-4BCD-93E2-E3B085C9AB24}">
-                <p16:designElem xmlns:p16="http://schemas.microsoft.com/office/powerpoint/2015/main" xmlns="" val="1"/>
+                <p16:designElem xmlns:p16="http://schemas.microsoft.com/office/powerpoint/2015/main" val="1"/>
               </p:ext>
             </p:extLst>
           </p:nvPr>
@@ -10566,38 +10534,33 @@
           <a:lstStyle/>
           <a:p>
             <a:r>
-              <a:rPr lang="en-US" sz="2400" dirty="0" smtClean="0"/>
+              <a:rPr lang="en-US" sz="2400" dirty="0"/>
               <a:t>Developer</a:t>
             </a:r>
-            <a:endParaRPr lang="en-US" sz="2400" dirty="0"/>
           </a:p>
           <a:p>
             <a:r>
               <a:rPr lang="en-US" sz="2400" dirty="0"/>
               <a:t>Leader/ Developer</a:t>
             </a:r>
-            <a:endParaRPr lang="en-US" sz="2400" dirty="0"/>
           </a:p>
           <a:p>
             <a:r>
               <a:rPr lang="en-US" sz="2400" dirty="0"/>
-              <a:t>Developer</a:t>
-            </a:r>
-            <a:endParaRPr lang="en-US" sz="2400" dirty="0"/>
-          </a:p>
-          <a:p>
-            <a:r>
-              <a:rPr lang="en-US" sz="2400" dirty="0" smtClean="0"/>
+              <a:t>Developer / Back and Front End</a:t>
+            </a:r>
+          </a:p>
+          <a:p>
+            <a:r>
+              <a:rPr lang="en-US" sz="2400" dirty="0"/>
               <a:t>Developer/ Group administrator</a:t>
             </a:r>
-            <a:endParaRPr lang="en-US" sz="2400" dirty="0"/>
-          </a:p>
-          <a:p>
-            <a:r>
-              <a:rPr lang="en-US" sz="2400" dirty="0" smtClean="0"/>
+          </a:p>
+          <a:p>
+            <a:r>
+              <a:rPr lang="en-US" sz="2400" dirty="0"/>
               <a:t>Developer/ Driver</a:t>
             </a:r>
-            <a:endParaRPr lang="en-US" sz="2400" dirty="0"/>
           </a:p>
         </p:txBody>
       </p:sp>
@@ -10679,7 +10642,7 @@
         </p:spPr>
         <p:txBody>
           <a:bodyPr>
-            <a:normAutofit fontScale="92500" lnSpcReduction="20000"/>
+            <a:normAutofit fontScale="85000" lnSpcReduction="10000"/>
           </a:bodyPr>
           <a:lstStyle/>
           <a:p>
@@ -10696,7 +10659,7 @@
             </a:r>
             <a:r>
               <a:rPr lang="en-US" sz="2400" dirty="0"/>
-              <a:t> project our clients, advance. The project will provide services such protection against DOS attack and network load-balancing for the connected applications without increasing response time. The system will also provide various user interfaces for: monitoring metrics such as packets per second and total packets passing through the system, backlisting and whitelisting IP’s and dynamically adding &amp; removing backends.</a:t>
+              <a:t> project for our clients, Advance. The project will provide services such protection against DDOS attacks with potential for further improvements. We will also provide network load-balancing for the connected applications without increasing response time. The system will also provide various user interfaces for: monitoring metrics such as packets per second and total packets passing through the system, backlisting and whitelisting IP’s and dynamically adding &amp; removing backends.</a:t>
             </a:r>
             <a:endParaRPr lang="en-US" dirty="0"/>
           </a:p>
@@ -11353,7 +11316,7 @@
             <a:pPr algn="ctr"/>
             <a:r>
               <a:rPr lang="en-US" b="1" dirty="0"/>
-              <a:t>The project magnet </a:t>
+              <a:t>Project Management </a:t>
             </a:r>
             <a:endParaRPr lang="en-US" dirty="0"/>
           </a:p>
@@ -11699,7 +11662,7 @@
   <a:extraClrSchemeLst/>
   <a:extLst>
     <a:ext uri="{05A4C25C-085E-4340-85A3-A5531E510DB2}">
-      <thm15:themeFamily xmlns:thm15="http://schemas.microsoft.com/office/thememl/2012/main" xmlns="" name="Wisp" id="{7CB32D59-10C0-40DD-B7BD-2E94284A981C}" vid="{24B1A44C-C006-48B2-A4D7-E5549B3D8CD4}"/>
+      <thm15:themeFamily xmlns:thm15="http://schemas.microsoft.com/office/thememl/2012/main" name="Wisp" id="{7CB32D59-10C0-40DD-B7BD-2E94284A981C}" vid="{24B1A44C-C006-48B2-A4D7-E5549B3D8CD4}"/>
     </a:ext>
   </a:extLst>
 </a:theme>

</xml_diff>